<commit_message>
Finish day2 AM lecture
</commit_message>
<xml_diff>
--- a/day5/lecture4_GLMM_beyond.pptx
+++ b/day5/lecture4_GLMM_beyond.pptx
@@ -6,7 +6,7 @@
     <p:sldMasterId id="2147483690" r:id="rId2"/>
   </p:sldMasterIdLst>
   <p:notesMasterIdLst>
-    <p:notesMasterId r:id="rId29"/>
+    <p:notesMasterId r:id="rId30"/>
   </p:notesMasterIdLst>
   <p:sldIdLst>
     <p:sldId id="256" r:id="rId3"/>
@@ -33,8 +33,9 @@
     <p:sldId id="278" r:id="rId24"/>
     <p:sldId id="279" r:id="rId25"/>
     <p:sldId id="280" r:id="rId26"/>
-    <p:sldId id="281" r:id="rId27"/>
-    <p:sldId id="282" r:id="rId28"/>
+    <p:sldId id="284" r:id="rId27"/>
+    <p:sldId id="281" r:id="rId28"/>
+    <p:sldId id="282" r:id="rId29"/>
   </p:sldIdLst>
   <p:sldSz cx="9144000" cy="6858000" type="screen4x3"/>
   <p:notesSz cx="6858000" cy="9144000"/>
@@ -227,7 +228,7 @@
           <a:p>
             <a:fld id="{B73D2FB9-C09F-4CC9-B56B-0E79DA024731}" type="datetimeFigureOut">
               <a:rPr lang="en-US" smtClean="0"/>
-              <a:t>1/18/2018</a:t>
+              <a:t>1/5/2022</a:t>
             </a:fld>
             <a:endParaRPr lang="en-US"/>
           </a:p>
@@ -660,7 +661,7 @@
           </a:ln>
           <a:extLst>
             <a:ext uri="{909E8E84-426E-40dd-AFC4-6F175D3DCCD1}">
-              <a14:hiddenFill xmlns="" xmlns:a14="http://schemas.microsoft.com/office/drawing/2010/main">
+              <a14:hiddenFill xmlns:a14="http://schemas.microsoft.com/office/drawing/2010/main" xmlns="">
                 <a:solidFill>
                   <a:srgbClr val="FFFFFF"/>
                 </a:solidFill>
@@ -703,7 +704,7 @@
           </a:ln>
           <a:extLst>
             <a:ext uri="{909E8E84-426E-40dd-AFC4-6F175D3DCCD1}">
-              <a14:hiddenFill xmlns="" xmlns:a14="http://schemas.microsoft.com/office/drawing/2010/main">
+              <a14:hiddenFill xmlns:a14="http://schemas.microsoft.com/office/drawing/2010/main" xmlns="">
                 <a:noFill/>
               </a14:hiddenFill>
             </a:ext>
@@ -802,7 +803,7 @@
           <a:p>
             <a:fld id="{39E044C2-93E3-4A4B-B6A1-D8E9993814C7}" type="datetime1">
               <a:rPr lang="en-US" smtClean="0"/>
-              <a:t>1/18/2018</a:t>
+              <a:t>1/5/2022</a:t>
             </a:fld>
             <a:endParaRPr lang="en-US"/>
           </a:p>
@@ -989,7 +990,7 @@
           <a:p>
             <a:fld id="{C817BF3A-F2D3-46BD-9E1F-1F9DD7E62B68}" type="datetime1">
               <a:rPr lang="en-US" smtClean="0"/>
-              <a:t>1/18/2018</a:t>
+              <a:t>1/5/2022</a:t>
             </a:fld>
             <a:endParaRPr lang="en-US"/>
           </a:p>
@@ -1185,7 +1186,7 @@
           <a:p>
             <a:fld id="{A25B53AB-0559-4EB5-BE4B-3F20476566A1}" type="datetime1">
               <a:rPr lang="en-US" smtClean="0"/>
-              <a:t>1/18/2018</a:t>
+              <a:t>1/5/2022</a:t>
             </a:fld>
             <a:endParaRPr lang="en-US"/>
           </a:p>
@@ -1437,7 +1438,7 @@
           <a:p>
             <a:fld id="{25085B04-7A33-416C-A7FB-D64ADDEB8FCC}" type="datetime1">
               <a:rPr lang="en-US" smtClean="0"/>
-              <a:t>1/18/2018</a:t>
+              <a:t>1/5/2022</a:t>
             </a:fld>
             <a:endParaRPr lang="en-US"/>
           </a:p>
@@ -1662,7 +1663,7 @@
           <a:p>
             <a:fld id="{25085B04-7A33-416C-A7FB-D64ADDEB8FCC}" type="datetime1">
               <a:rPr lang="en-US" smtClean="0"/>
-              <a:t>1/18/2018</a:t>
+              <a:t>1/5/2022</a:t>
             </a:fld>
             <a:endParaRPr lang="en-US"/>
           </a:p>
@@ -1971,7 +1972,7 @@
           <a:p>
             <a:fld id="{25085B04-7A33-416C-A7FB-D64ADDEB8FCC}" type="datetime1">
               <a:rPr lang="en-US" smtClean="0"/>
-              <a:t>1/18/2018</a:t>
+              <a:t>1/5/2022</a:t>
             </a:fld>
             <a:endParaRPr lang="en-US"/>
           </a:p>
@@ -2140,7 +2141,7 @@
           <a:p>
             <a:fld id="{25085B04-7A33-416C-A7FB-D64ADDEB8FCC}" type="datetime1">
               <a:rPr lang="en-US" smtClean="0"/>
-              <a:t>1/18/2018</a:t>
+              <a:t>1/5/2022</a:t>
             </a:fld>
             <a:endParaRPr lang="en-US"/>
           </a:p>
@@ -2453,7 +2454,7 @@
           <a:p>
             <a:fld id="{25085B04-7A33-416C-A7FB-D64ADDEB8FCC}" type="datetime1">
               <a:rPr lang="en-US" smtClean="0"/>
-              <a:t>1/18/2018</a:t>
+              <a:t>1/5/2022</a:t>
             </a:fld>
             <a:endParaRPr lang="en-US"/>
           </a:p>
@@ -2766,7 +2767,7 @@
           <a:p>
             <a:fld id="{25085B04-7A33-416C-A7FB-D64ADDEB8FCC}" type="datetime1">
               <a:rPr lang="en-US" smtClean="0"/>
-              <a:t>1/18/2018</a:t>
+              <a:t>1/5/2022</a:t>
             </a:fld>
             <a:endParaRPr lang="en-US"/>
           </a:p>
@@ -2987,7 +2988,7 @@
           <a:p>
             <a:fld id="{BA23EE8D-9CE0-4F42-A40F-E28604EA7175}" type="datetime1">
               <a:rPr lang="en-US" smtClean="0"/>
-              <a:t>1/18/2018</a:t>
+              <a:t>1/5/2022</a:t>
             </a:fld>
             <a:endParaRPr lang="en-US"/>
           </a:p>
@@ -3185,7 +3186,7 @@
           <a:p>
             <a:fld id="{1A4DAFB5-4EEC-49BD-AB33-559CD6F558E3}" type="datetime1">
               <a:rPr lang="en-US" smtClean="0"/>
-              <a:t>1/18/2018</a:t>
+              <a:t>1/5/2022</a:t>
             </a:fld>
             <a:endParaRPr lang="en-US"/>
           </a:p>
@@ -3371,7 +3372,7 @@
           <a:p>
             <a:fld id="{48D5DDFF-6E4E-48D6-AC14-E6CBA3C0FEB2}" type="datetime1">
               <a:rPr lang="en-US" smtClean="0"/>
-              <a:t>1/18/2018</a:t>
+              <a:t>1/5/2022</a:t>
             </a:fld>
             <a:endParaRPr lang="en-US"/>
           </a:p>
@@ -3646,7 +3647,7 @@
           <a:p>
             <a:fld id="{1EE2056D-DC17-4607-87F9-EA4937BD48E2}" type="datetime1">
               <a:rPr lang="en-US" smtClean="0"/>
-              <a:t>1/18/2018</a:t>
+              <a:t>1/5/2022</a:t>
             </a:fld>
             <a:endParaRPr lang="en-US"/>
           </a:p>
@@ -3911,7 +3912,7 @@
           <a:p>
             <a:fld id="{866E3DAD-9254-43DE-A1F3-F1D56B1E5B5F}" type="datetime1">
               <a:rPr lang="en-US" smtClean="0"/>
-              <a:t>1/18/2018</a:t>
+              <a:t>1/5/2022</a:t>
             </a:fld>
             <a:endParaRPr lang="en-US"/>
           </a:p>
@@ -4323,7 +4324,7 @@
           <a:p>
             <a:fld id="{12F88D45-78A7-46A0-99B7-2046E351D366}" type="datetime1">
               <a:rPr lang="en-US" smtClean="0"/>
-              <a:t>1/18/2018</a:t>
+              <a:t>1/5/2022</a:t>
             </a:fld>
             <a:endParaRPr lang="en-US"/>
           </a:p>
@@ -4464,7 +4465,7 @@
           <a:p>
             <a:fld id="{7716AC84-6778-466F-95F9-3EEE8E306ABF}" type="datetime1">
               <a:rPr lang="en-US" smtClean="0"/>
-              <a:t>1/18/2018</a:t>
+              <a:t>1/5/2022</a:t>
             </a:fld>
             <a:endParaRPr lang="en-US"/>
           </a:p>
@@ -4577,7 +4578,7 @@
           <a:p>
             <a:fld id="{02DEDAFE-CBEF-41E8-868F-E40C867A5636}" type="datetime1">
               <a:rPr lang="en-US" smtClean="0"/>
-              <a:t>1/18/2018</a:t>
+              <a:t>1/5/2022</a:t>
             </a:fld>
             <a:endParaRPr lang="en-US"/>
           </a:p>
@@ -4888,7 +4889,7 @@
           <a:p>
             <a:fld id="{20C87E4D-F358-4436-A283-114607D95274}" type="datetime1">
               <a:rPr lang="en-US" smtClean="0"/>
-              <a:t>1/18/2018</a:t>
+              <a:t>1/5/2022</a:t>
             </a:fld>
             <a:endParaRPr lang="en-US"/>
           </a:p>
@@ -5179,7 +5180,7 @@
           <a:p>
             <a:fld id="{6CCABA82-8A7B-4924-987B-0B7221667B17}" type="datetime1">
               <a:rPr lang="en-US" smtClean="0"/>
-              <a:t>1/18/2018</a:t>
+              <a:t>1/5/2022</a:t>
             </a:fld>
             <a:endParaRPr lang="en-US"/>
           </a:p>
@@ -5377,7 +5378,7 @@
           <a:p>
             <a:fld id="{C602C5EE-1F52-440A-B21D-CF34717184B1}" type="datetime1">
               <a:rPr lang="en-US" smtClean="0"/>
-              <a:t>1/18/2018</a:t>
+              <a:t>1/5/2022</a:t>
             </a:fld>
             <a:endParaRPr lang="en-US"/>
           </a:p>
@@ -5585,7 +5586,7 @@
           <a:p>
             <a:fld id="{88EA7AC3-3927-460F-BC0A-B8263F635273}" type="datetime1">
               <a:rPr lang="en-US" smtClean="0"/>
-              <a:t>1/18/2018</a:t>
+              <a:t>1/5/2022</a:t>
             </a:fld>
             <a:endParaRPr lang="en-US"/>
           </a:p>
@@ -5794,7 +5795,7 @@
           <a:p>
             <a:fld id="{0FFE502A-1A4E-496B-B2D2-529468F64463}" type="datetime1">
               <a:rPr lang="en-US" smtClean="0"/>
-              <a:t>1/18/2018</a:t>
+              <a:t>1/5/2022</a:t>
             </a:fld>
             <a:endParaRPr lang="en-US"/>
           </a:p>
@@ -6097,7 +6098,7 @@
           <a:p>
             <a:fld id="{883C4EB8-5BFD-4159-A72D-C2776364B018}" type="datetime1">
               <a:rPr lang="en-US" smtClean="0"/>
-              <a:t>1/18/2018</a:t>
+              <a:t>1/5/2022</a:t>
             </a:fld>
             <a:endParaRPr lang="en-US"/>
           </a:p>
@@ -6539,7 +6540,7 @@
           <a:p>
             <a:fld id="{5A7D63EA-6161-451A-A0F2-180457136142}" type="datetime1">
               <a:rPr lang="en-US" smtClean="0"/>
-              <a:t>1/18/2018</a:t>
+              <a:t>1/5/2022</a:t>
             </a:fld>
             <a:endParaRPr lang="en-US"/>
           </a:p>
@@ -6674,7 +6675,7 @@
           <a:p>
             <a:fld id="{BABC1D1C-8B0E-4131-A976-A04913DCA754}" type="datetime1">
               <a:rPr lang="en-US" smtClean="0"/>
-              <a:t>1/18/2018</a:t>
+              <a:t>1/5/2022</a:t>
             </a:fld>
             <a:endParaRPr lang="en-US"/>
           </a:p>
@@ -6787,7 +6788,7 @@
           <a:p>
             <a:fld id="{EF1416D0-C41F-4D88-B020-7F74E89E4490}" type="datetime1">
               <a:rPr lang="en-US" smtClean="0"/>
-              <a:t>1/18/2018</a:t>
+              <a:t>1/5/2022</a:t>
             </a:fld>
             <a:endParaRPr lang="en-US"/>
           </a:p>
@@ -7080,7 +7081,7 @@
           <a:p>
             <a:fld id="{B8924456-345A-46DF-8D2A-935514574781}" type="datetime1">
               <a:rPr lang="en-US" smtClean="0"/>
-              <a:t>1/18/2018</a:t>
+              <a:t>1/5/2022</a:t>
             </a:fld>
             <a:endParaRPr lang="en-US"/>
           </a:p>
@@ -7354,7 +7355,7 @@
           <a:p>
             <a:fld id="{5639636D-8884-4082-A066-DA2A6F62C12B}" type="datetime1">
               <a:rPr lang="en-US" smtClean="0"/>
-              <a:t>1/18/2018</a:t>
+              <a:t>1/5/2022</a:t>
             </a:fld>
             <a:endParaRPr lang="en-US"/>
           </a:p>
@@ -7476,17 +7477,17 @@
           </a:ln>
           <a:extLst>
             <a:ext uri="{FAA26D3D-D897-4be2-8F04-BA451C77F1D7}">
-              <ma14:placeholderFlag xmlns="" xmlns:ma14="http://schemas.microsoft.com/office/mac/drawingml/2011/main" val="1"/>
+              <ma14:placeholderFlag xmlns:ma14="http://schemas.microsoft.com/office/mac/drawingml/2011/main" xmlns="" val="1"/>
             </a:ext>
             <a:ext uri="{909E8E84-426E-40dd-AFC4-6F175D3DCCD1}">
-              <a14:hiddenFill xmlns="" xmlns:a14="http://schemas.microsoft.com/office/drawing/2010/main">
+              <a14:hiddenFill xmlns:a14="http://schemas.microsoft.com/office/drawing/2010/main" xmlns="">
                 <a:solidFill>
                   <a:srgbClr val="FFFFFF"/>
                 </a:solidFill>
               </a14:hiddenFill>
             </a:ext>
             <a:ext uri="{91240B29-F687-4f45-9708-019B960494DF}">
-              <a14:hiddenLine xmlns="" xmlns:a14="http://schemas.microsoft.com/office/drawing/2010/main" w="9525">
+              <a14:hiddenLine xmlns:a14="http://schemas.microsoft.com/office/drawing/2010/main" xmlns="" w="9525">
                 <a:solidFill>
                   <a:srgbClr val="000000"/>
                 </a:solidFill>
@@ -7538,17 +7539,17 @@
           </a:ln>
           <a:extLst>
             <a:ext uri="{FAA26D3D-D897-4be2-8F04-BA451C77F1D7}">
-              <ma14:placeholderFlag xmlns="" xmlns:ma14="http://schemas.microsoft.com/office/mac/drawingml/2011/main" val="1"/>
+              <ma14:placeholderFlag xmlns:ma14="http://schemas.microsoft.com/office/mac/drawingml/2011/main" xmlns="" val="1"/>
             </a:ext>
             <a:ext uri="{909E8E84-426E-40dd-AFC4-6F175D3DCCD1}">
-              <a14:hiddenFill xmlns="" xmlns:a14="http://schemas.microsoft.com/office/drawing/2010/main">
+              <a14:hiddenFill xmlns:a14="http://schemas.microsoft.com/office/drawing/2010/main" xmlns="">
                 <a:solidFill>
                   <a:srgbClr val="FFFFFF"/>
                 </a:solidFill>
               </a14:hiddenFill>
             </a:ext>
             <a:ext uri="{91240B29-F687-4f45-9708-019B960494DF}">
-              <a14:hiddenLine xmlns="" xmlns:a14="http://schemas.microsoft.com/office/drawing/2010/main" w="9525">
+              <a14:hiddenLine xmlns:a14="http://schemas.microsoft.com/office/drawing/2010/main" xmlns="" w="9525">
                 <a:solidFill>
                   <a:srgbClr val="000000"/>
                 </a:solidFill>
@@ -7648,7 +7649,7 @@
           <a:p>
             <a:fld id="{25085B04-7A33-416C-A7FB-D64ADDEB8FCC}" type="datetime1">
               <a:rPr lang="en-US" smtClean="0"/>
-              <a:t>1/18/2018</a:t>
+              <a:t>1/5/2022</a:t>
             </a:fld>
             <a:endParaRPr lang="en-US"/>
           </a:p>
@@ -7816,7 +7817,7 @@
           </a:ln>
           <a:extLst>
             <a:ext uri="{909E8E84-426E-40dd-AFC4-6F175D3DCCD1}">
-              <a14:hiddenFill xmlns="" xmlns:a14="http://schemas.microsoft.com/office/drawing/2010/main">
+              <a14:hiddenFill xmlns:a14="http://schemas.microsoft.com/office/drawing/2010/main" xmlns="">
                 <a:solidFill>
                   <a:srgbClr val="FFFFFF"/>
                 </a:solidFill>
@@ -7859,7 +7860,7 @@
           </a:ln>
           <a:extLst>
             <a:ext uri="{909E8E84-426E-40dd-AFC4-6F175D3DCCD1}">
-              <a14:hiddenFill xmlns="" xmlns:a14="http://schemas.microsoft.com/office/drawing/2010/main">
+              <a14:hiddenFill xmlns:a14="http://schemas.microsoft.com/office/drawing/2010/main" xmlns="">
                 <a:noFill/>
               </a14:hiddenFill>
             </a:ext>
@@ -8495,7 +8496,7 @@
           <a:p>
             <a:fld id="{A7853F80-D63E-429F-B326-B00475E1D8E8}" type="datetime1">
               <a:rPr lang="en-US" smtClean="0"/>
-              <a:t>1/18/2018</a:t>
+              <a:t>1/5/2022</a:t>
             </a:fld>
             <a:endParaRPr lang="en-US"/>
           </a:p>
@@ -8971,17 +8972,17 @@
           </a:ln>
           <a:extLst>
             <a:ext uri="{FAA26D3D-D897-4be2-8F04-BA451C77F1D7}">
-              <ma14:placeholderFlag xmlns="" xmlns:ma14="http://schemas.microsoft.com/office/mac/drawingml/2011/main" val="1"/>
+              <ma14:placeholderFlag xmlns:ma14="http://schemas.microsoft.com/office/mac/drawingml/2011/main" xmlns="" val="1"/>
             </a:ext>
             <a:ext uri="{909E8E84-426E-40dd-AFC4-6F175D3DCCD1}">
-              <a14:hiddenFill xmlns="" xmlns:a14="http://schemas.microsoft.com/office/drawing/2010/main">
+              <a14:hiddenFill xmlns:a14="http://schemas.microsoft.com/office/drawing/2010/main" xmlns="">
                 <a:solidFill>
                   <a:srgbClr val="FFFFFF"/>
                 </a:solidFill>
               </a14:hiddenFill>
             </a:ext>
             <a:ext uri="{91240B29-F687-4f45-9708-019B960494DF}">
-              <a14:hiddenLine xmlns="" xmlns:a14="http://schemas.microsoft.com/office/drawing/2010/main" w="9525">
+              <a14:hiddenLine xmlns:a14="http://schemas.microsoft.com/office/drawing/2010/main" xmlns="" w="9525">
                 <a:solidFill>
                   <a:srgbClr val="000000"/>
                 </a:solidFill>
@@ -12697,7 +12698,7 @@
           <p:cNvPr id="2" name="Title 1">
             <a:extLst>
               <a:ext uri="{FF2B5EF4-FFF2-40B4-BE49-F238E27FC236}">
-                <a16:creationId xmlns:a16="http://schemas.microsoft.com/office/drawing/2014/main" id="{159784FA-3D00-4D6B-B4DF-95D2F9370B8E}"/>
+                <a16:creationId xmlns:a16="http://schemas.microsoft.com/office/drawing/2014/main" id="{EFD218E0-619D-4D54-85B9-4B8718024B1E}"/>
               </a:ext>
             </a:extLst>
           </p:cNvPr>
@@ -12715,7 +12716,7 @@
           <a:p>
             <a:r>
               <a:rPr lang="en-US" dirty="0"/>
-              <a:t>Bayesian additions</a:t>
+              <a:t>Likelihood functions</a:t>
             </a:r>
           </a:p>
         </p:txBody>
@@ -12725,7 +12726,7 @@
           <p:cNvPr id="3" name="Content Placeholder 2">
             <a:extLst>
               <a:ext uri="{FF2B5EF4-FFF2-40B4-BE49-F238E27FC236}">
-                <a16:creationId xmlns:a16="http://schemas.microsoft.com/office/drawing/2014/main" id="{5CD64A8C-0FEA-42B0-B05D-3AE8B9062C05}"/>
+                <a16:creationId xmlns:a16="http://schemas.microsoft.com/office/drawing/2014/main" id="{F8E68827-4058-4984-8CB2-ADF697C9BFDC}"/>
               </a:ext>
             </a:extLst>
           </p:cNvPr>
@@ -12736,27 +12737,42 @@
             <p:ph idx="1"/>
           </p:nvPr>
         </p:nvSpPr>
-        <p:spPr/>
-        <p:txBody>
-          <a:bodyPr/>
+        <p:spPr>
+          <a:xfrm>
+            <a:off x="628650" y="1415295"/>
+            <a:ext cx="7886700" cy="1727200"/>
+          </a:xfrm>
+        </p:spPr>
+        <p:txBody>
+          <a:bodyPr>
+            <a:normAutofit/>
+          </a:bodyPr>
           <a:lstStyle/>
           <a:p>
             <a:r>
               <a:rPr lang="en-US" dirty="0"/>
-              <a:t>This model is setup to do a Bayesian analysis</a:t>
+              <a:t>Can also write our own functions</a:t>
             </a:r>
           </a:p>
           <a:p>
             <a:r>
               <a:rPr lang="en-US" dirty="0"/>
-              <a:t>Tomorrow we will return and look at this more closely and run it</a:t>
-            </a:r>
-          </a:p>
-          <a:p>
+              <a:t>Put them at top of template file (but after </a:t>
+            </a:r>
+            <a:r>
+              <a:rPr lang="en-US" dirty="0">
+                <a:latin typeface="Courier New" panose="02070309020205020404" pitchFamily="49" charset="0"/>
+                <a:cs typeface="Courier New" panose="02070309020205020404" pitchFamily="49" charset="0"/>
+              </a:rPr>
+              <a:t>#include </a:t>
+            </a:r>
             <a:r>
               <a:rPr lang="en-US" dirty="0"/>
-              <a:t>We ignore them for now</a:t>
-            </a:r>
+              <a:t>statement</a:t>
+            </a:r>
+          </a:p>
+          <a:p>
+            <a:endParaRPr lang="en-US" dirty="0"/>
           </a:p>
         </p:txBody>
       </p:sp>
@@ -12765,7 +12781,7 @@
           <p:cNvPr id="4" name="Slide Number Placeholder 3">
             <a:extLst>
               <a:ext uri="{FF2B5EF4-FFF2-40B4-BE49-F238E27FC236}">
-                <a16:creationId xmlns:a16="http://schemas.microsoft.com/office/drawing/2014/main" id="{ECA783B1-D58E-4038-BFFC-739F09B404D6}"/>
+                <a16:creationId xmlns:a16="http://schemas.microsoft.com/office/drawing/2014/main" id="{77562727-D825-4649-99FD-00A6A6CF4718}"/>
               </a:ext>
             </a:extLst>
           </p:cNvPr>
@@ -12789,10 +12805,927 @@
           </a:p>
         </p:txBody>
       </p:sp>
+      <p:sp>
+        <p:nvSpPr>
+          <p:cNvPr id="5" name="TextBox 4">
+            <a:extLst>
+              <a:ext uri="{FF2B5EF4-FFF2-40B4-BE49-F238E27FC236}">
+                <a16:creationId xmlns:a16="http://schemas.microsoft.com/office/drawing/2014/main" id="{126FBAF6-2BBE-4492-A119-D65086B8301C}"/>
+              </a:ext>
+            </a:extLst>
+          </p:cNvPr>
+          <p:cNvSpPr txBox="1"/>
+          <p:nvPr/>
+        </p:nvSpPr>
+        <p:spPr>
+          <a:xfrm>
+            <a:off x="333374" y="3362325"/>
+            <a:ext cx="8353425" cy="3139321"/>
+          </a:xfrm>
+          <a:prstGeom prst="rect">
+            <a:avLst/>
+          </a:prstGeom>
+          <a:noFill/>
+          <a:ln>
+            <a:solidFill>
+              <a:schemeClr val="tx1"/>
+            </a:solidFill>
+          </a:ln>
+        </p:spPr>
+        <p:txBody>
+          <a:bodyPr wrap="square" rtlCol="0">
+            <a:spAutoFit/>
+          </a:bodyPr>
+          <a:lstStyle/>
+          <a:p>
+            <a:r>
+              <a:rPr lang="en-US" sz="2000" b="1" dirty="0">
+                <a:solidFill>
+                  <a:srgbClr val="000080"/>
+                </a:solidFill>
+                <a:latin typeface="Courier New" panose="02070309020205020404" pitchFamily="49" charset="0"/>
+              </a:rPr>
+              <a:t>//</a:t>
+            </a:r>
+            <a:r>
+              <a:rPr lang="en-US" sz="2000" dirty="0">
+                <a:solidFill>
+                  <a:srgbClr val="000000"/>
+                </a:solidFill>
+                <a:latin typeface="Courier New" panose="02070309020205020404" pitchFamily="49" charset="0"/>
+              </a:rPr>
+              <a:t> inverse </a:t>
+            </a:r>
+            <a:r>
+              <a:rPr lang="en-US" sz="2000" dirty="0">
+                <a:solidFill>
+                  <a:srgbClr val="8000FF"/>
+                </a:solidFill>
+                <a:latin typeface="Courier New" panose="02070309020205020404" pitchFamily="49" charset="0"/>
+              </a:rPr>
+              <a:t>gamma</a:t>
+            </a:r>
+            <a:r>
+              <a:rPr lang="en-US" sz="2000" dirty="0">
+                <a:solidFill>
+                  <a:srgbClr val="000000"/>
+                </a:solidFill>
+                <a:latin typeface="Courier New" panose="02070309020205020404" pitchFamily="49" charset="0"/>
+              </a:rPr>
+              <a:t> density</a:t>
+            </a:r>
+          </a:p>
+          <a:p>
+            <a:r>
+              <a:rPr lang="en-US" sz="2000" dirty="0">
+                <a:solidFill>
+                  <a:srgbClr val="000000"/>
+                </a:solidFill>
+                <a:latin typeface="Courier New" panose="02070309020205020404" pitchFamily="49" charset="0"/>
+              </a:rPr>
+              <a:t>template</a:t>
+            </a:r>
+            <a:r>
+              <a:rPr lang="en-US" sz="2000" b="1" dirty="0">
+                <a:solidFill>
+                  <a:srgbClr val="000080"/>
+                </a:solidFill>
+                <a:latin typeface="Courier New" panose="02070309020205020404" pitchFamily="49" charset="0"/>
+              </a:rPr>
+              <a:t>&lt;</a:t>
+            </a:r>
+            <a:r>
+              <a:rPr lang="en-US" sz="2000" dirty="0">
+                <a:solidFill>
+                  <a:srgbClr val="8000FF"/>
+                </a:solidFill>
+                <a:latin typeface="Courier New" panose="02070309020205020404" pitchFamily="49" charset="0"/>
+              </a:rPr>
+              <a:t>class</a:t>
+            </a:r>
+            <a:r>
+              <a:rPr lang="en-US" sz="2000" dirty="0">
+                <a:solidFill>
+                  <a:srgbClr val="000000"/>
+                </a:solidFill>
+                <a:latin typeface="Courier New" panose="02070309020205020404" pitchFamily="49" charset="0"/>
+              </a:rPr>
+              <a:t> Type</a:t>
+            </a:r>
+            <a:r>
+              <a:rPr lang="en-US" sz="2000" b="1" dirty="0">
+                <a:solidFill>
+                  <a:srgbClr val="000080"/>
+                </a:solidFill>
+                <a:latin typeface="Courier New" panose="02070309020205020404" pitchFamily="49" charset="0"/>
+              </a:rPr>
+              <a:t>&gt;</a:t>
+            </a:r>
+            <a:r>
+              <a:rPr lang="en-US" sz="2000" dirty="0">
+                <a:solidFill>
+                  <a:srgbClr val="000000"/>
+                </a:solidFill>
+                <a:latin typeface="Courier New" panose="02070309020205020404" pitchFamily="49" charset="0"/>
+              </a:rPr>
+              <a:t> </a:t>
+            </a:r>
+          </a:p>
+          <a:p>
+            <a:r>
+              <a:rPr lang="en-US" sz="2000" dirty="0">
+                <a:solidFill>
+                  <a:srgbClr val="000000"/>
+                </a:solidFill>
+                <a:latin typeface="Courier New" panose="02070309020205020404" pitchFamily="49" charset="0"/>
+              </a:rPr>
+              <a:t>Type </a:t>
+            </a:r>
+            <a:r>
+              <a:rPr lang="en-US" sz="2000" dirty="0" err="1">
+                <a:solidFill>
+                  <a:srgbClr val="000000"/>
+                </a:solidFill>
+                <a:latin typeface="Courier New" panose="02070309020205020404" pitchFamily="49" charset="0"/>
+              </a:rPr>
+              <a:t>dinvgauss</a:t>
+            </a:r>
+            <a:r>
+              <a:rPr lang="en-US" sz="2000" b="1" dirty="0">
+                <a:solidFill>
+                  <a:srgbClr val="000080"/>
+                </a:solidFill>
+                <a:latin typeface="Courier New" panose="02070309020205020404" pitchFamily="49" charset="0"/>
+              </a:rPr>
+              <a:t>(</a:t>
+            </a:r>
+            <a:r>
+              <a:rPr lang="en-US" sz="2000" dirty="0">
+                <a:solidFill>
+                  <a:srgbClr val="000000"/>
+                </a:solidFill>
+                <a:latin typeface="Courier New" panose="02070309020205020404" pitchFamily="49" charset="0"/>
+              </a:rPr>
+              <a:t>Type x, Type </a:t>
+            </a:r>
+            <a:r>
+              <a:rPr lang="en-US" sz="2000" dirty="0">
+                <a:solidFill>
+                  <a:srgbClr val="8000FF"/>
+                </a:solidFill>
+                <a:latin typeface="Courier New" panose="02070309020205020404" pitchFamily="49" charset="0"/>
+              </a:rPr>
+              <a:t>mean</a:t>
+            </a:r>
+            <a:r>
+              <a:rPr lang="en-US" sz="2000" dirty="0">
+                <a:solidFill>
+                  <a:srgbClr val="000000"/>
+                </a:solidFill>
+                <a:latin typeface="Courier New" panose="02070309020205020404" pitchFamily="49" charset="0"/>
+              </a:rPr>
+              <a:t>, Type shape, </a:t>
+            </a:r>
+            <a:r>
+              <a:rPr lang="en-US" sz="2000" dirty="0" err="1">
+                <a:solidFill>
+                  <a:srgbClr val="000000"/>
+                </a:solidFill>
+                <a:latin typeface="Courier New" panose="02070309020205020404" pitchFamily="49" charset="0"/>
+              </a:rPr>
+              <a:t>int</a:t>
+            </a:r>
+            <a:r>
+              <a:rPr lang="en-US" sz="2000" dirty="0">
+                <a:solidFill>
+                  <a:srgbClr val="000000"/>
+                </a:solidFill>
+                <a:latin typeface="Courier New" panose="02070309020205020404" pitchFamily="49" charset="0"/>
+              </a:rPr>
+              <a:t> </a:t>
+            </a:r>
+            <a:r>
+              <a:rPr lang="en-US" sz="2000" dirty="0" err="1">
+                <a:solidFill>
+                  <a:srgbClr val="000000"/>
+                </a:solidFill>
+                <a:latin typeface="Courier New" panose="02070309020205020404" pitchFamily="49" charset="0"/>
+              </a:rPr>
+              <a:t>give_log</a:t>
+            </a:r>
+            <a:r>
+              <a:rPr lang="en-US" sz="2000" b="1" dirty="0">
+                <a:solidFill>
+                  <a:srgbClr val="000080"/>
+                </a:solidFill>
+                <a:latin typeface="Courier New" panose="02070309020205020404" pitchFamily="49" charset="0"/>
+              </a:rPr>
+              <a:t>=</a:t>
+            </a:r>
+            <a:r>
+              <a:rPr lang="en-US" sz="2000" dirty="0">
+                <a:solidFill>
+                  <a:srgbClr val="FF8000"/>
+                </a:solidFill>
+                <a:latin typeface="Courier New" panose="02070309020205020404" pitchFamily="49" charset="0"/>
+              </a:rPr>
+              <a:t>0</a:t>
+            </a:r>
+            <a:r>
+              <a:rPr lang="en-US" sz="2000" b="1" dirty="0">
+                <a:solidFill>
+                  <a:srgbClr val="000080"/>
+                </a:solidFill>
+                <a:latin typeface="Courier New" panose="02070309020205020404" pitchFamily="49" charset="0"/>
+              </a:rPr>
+              <a:t>){</a:t>
+            </a:r>
+            <a:r>
+              <a:rPr lang="en-US" sz="2000" dirty="0">
+                <a:solidFill>
+                  <a:srgbClr val="000000"/>
+                </a:solidFill>
+                <a:latin typeface="Courier New" panose="02070309020205020404" pitchFamily="49" charset="0"/>
+              </a:rPr>
+              <a:t> </a:t>
+            </a:r>
+          </a:p>
+          <a:p>
+            <a:r>
+              <a:rPr lang="en-US" sz="2000" dirty="0">
+                <a:solidFill>
+                  <a:srgbClr val="000000"/>
+                </a:solidFill>
+                <a:latin typeface="Courier New" panose="02070309020205020404" pitchFamily="49" charset="0"/>
+              </a:rPr>
+              <a:t>Type </a:t>
+            </a:r>
+            <a:r>
+              <a:rPr lang="en-US" sz="2000" dirty="0" err="1">
+                <a:solidFill>
+                  <a:srgbClr val="000000"/>
+                </a:solidFill>
+                <a:latin typeface="Courier New" panose="02070309020205020404" pitchFamily="49" charset="0"/>
+              </a:rPr>
+              <a:t>logres</a:t>
+            </a:r>
+            <a:r>
+              <a:rPr lang="en-US" sz="2000" dirty="0">
+                <a:solidFill>
+                  <a:srgbClr val="000000"/>
+                </a:solidFill>
+                <a:latin typeface="Courier New" panose="02070309020205020404" pitchFamily="49" charset="0"/>
+              </a:rPr>
+              <a:t> </a:t>
+            </a:r>
+            <a:r>
+              <a:rPr lang="en-US" sz="2000" b="1" dirty="0">
+                <a:solidFill>
+                  <a:srgbClr val="000080"/>
+                </a:solidFill>
+                <a:latin typeface="Courier New" panose="02070309020205020404" pitchFamily="49" charset="0"/>
+              </a:rPr>
+              <a:t>=</a:t>
+            </a:r>
+            <a:r>
+              <a:rPr lang="en-US" sz="2000" dirty="0">
+                <a:solidFill>
+                  <a:srgbClr val="000000"/>
+                </a:solidFill>
+                <a:latin typeface="Courier New" panose="02070309020205020404" pitchFamily="49" charset="0"/>
+              </a:rPr>
+              <a:t> </a:t>
+            </a:r>
+            <a:r>
+              <a:rPr lang="en-US" sz="2000" dirty="0">
+                <a:solidFill>
+                  <a:srgbClr val="FF8000"/>
+                </a:solidFill>
+                <a:latin typeface="Courier New" panose="02070309020205020404" pitchFamily="49" charset="0"/>
+              </a:rPr>
+              <a:t>0.5</a:t>
+            </a:r>
+            <a:r>
+              <a:rPr lang="en-US" sz="2000" b="1" dirty="0">
+                <a:solidFill>
+                  <a:srgbClr val="000080"/>
+                </a:solidFill>
+                <a:latin typeface="Courier New" panose="02070309020205020404" pitchFamily="49" charset="0"/>
+              </a:rPr>
+              <a:t>*</a:t>
+            </a:r>
+            <a:r>
+              <a:rPr lang="en-US" sz="2000" dirty="0">
+                <a:solidFill>
+                  <a:srgbClr val="8000FF"/>
+                </a:solidFill>
+                <a:latin typeface="Courier New" panose="02070309020205020404" pitchFamily="49" charset="0"/>
+              </a:rPr>
+              <a:t>log</a:t>
+            </a:r>
+            <a:r>
+              <a:rPr lang="en-US" sz="2000" b="1" dirty="0">
+                <a:solidFill>
+                  <a:srgbClr val="000080"/>
+                </a:solidFill>
+                <a:latin typeface="Courier New" panose="02070309020205020404" pitchFamily="49" charset="0"/>
+              </a:rPr>
+              <a:t>(</a:t>
+            </a:r>
+            <a:r>
+              <a:rPr lang="en-US" sz="2000" dirty="0">
+                <a:solidFill>
+                  <a:srgbClr val="000000"/>
+                </a:solidFill>
+                <a:latin typeface="Courier New" panose="02070309020205020404" pitchFamily="49" charset="0"/>
+              </a:rPr>
+              <a:t>shape</a:t>
+            </a:r>
+            <a:r>
+              <a:rPr lang="en-US" sz="2000" b="1" dirty="0">
+                <a:solidFill>
+                  <a:srgbClr val="000080"/>
+                </a:solidFill>
+                <a:latin typeface="Courier New" panose="02070309020205020404" pitchFamily="49" charset="0"/>
+              </a:rPr>
+              <a:t>)</a:t>
+            </a:r>
+            <a:r>
+              <a:rPr lang="en-US" sz="2000" dirty="0">
+                <a:solidFill>
+                  <a:srgbClr val="000000"/>
+                </a:solidFill>
+                <a:latin typeface="Courier New" panose="02070309020205020404" pitchFamily="49" charset="0"/>
+              </a:rPr>
+              <a:t> – </a:t>
+            </a:r>
+          </a:p>
+          <a:p>
+            <a:r>
+              <a:rPr lang="en-US" sz="2000" dirty="0">
+                <a:solidFill>
+                  <a:srgbClr val="000000"/>
+                </a:solidFill>
+                <a:latin typeface="Courier New" panose="02070309020205020404" pitchFamily="49" charset="0"/>
+              </a:rPr>
+              <a:t>   </a:t>
+            </a:r>
+            <a:r>
+              <a:rPr lang="en-US" sz="2000" dirty="0">
+                <a:solidFill>
+                  <a:srgbClr val="FF8000"/>
+                </a:solidFill>
+                <a:latin typeface="Courier New" panose="02070309020205020404" pitchFamily="49" charset="0"/>
+              </a:rPr>
+              <a:t>0.5</a:t>
+            </a:r>
+            <a:r>
+              <a:rPr lang="en-US" sz="2000" b="1" dirty="0">
+                <a:solidFill>
+                  <a:srgbClr val="000080"/>
+                </a:solidFill>
+                <a:latin typeface="Courier New" panose="02070309020205020404" pitchFamily="49" charset="0"/>
+              </a:rPr>
+              <a:t>*</a:t>
+            </a:r>
+            <a:r>
+              <a:rPr lang="en-US" sz="2000" dirty="0">
+                <a:solidFill>
+                  <a:srgbClr val="8000FF"/>
+                </a:solidFill>
+                <a:latin typeface="Courier New" panose="02070309020205020404" pitchFamily="49" charset="0"/>
+              </a:rPr>
+              <a:t>log</a:t>
+            </a:r>
+            <a:r>
+              <a:rPr lang="en-US" sz="2000" b="1" dirty="0">
+                <a:solidFill>
+                  <a:srgbClr val="000080"/>
+                </a:solidFill>
+                <a:latin typeface="Courier New" panose="02070309020205020404" pitchFamily="49" charset="0"/>
+              </a:rPr>
+              <a:t>(</a:t>
+            </a:r>
+            <a:r>
+              <a:rPr lang="en-US" sz="2000" dirty="0">
+                <a:solidFill>
+                  <a:srgbClr val="FF8000"/>
+                </a:solidFill>
+                <a:latin typeface="Courier New" panose="02070309020205020404" pitchFamily="49" charset="0"/>
+              </a:rPr>
+              <a:t>2</a:t>
+            </a:r>
+            <a:r>
+              <a:rPr lang="en-US" sz="2000" b="1" dirty="0">
+                <a:solidFill>
+                  <a:srgbClr val="000080"/>
+                </a:solidFill>
+                <a:latin typeface="Courier New" panose="02070309020205020404" pitchFamily="49" charset="0"/>
+              </a:rPr>
+              <a:t>*</a:t>
+            </a:r>
+            <a:r>
+              <a:rPr lang="en-US" sz="2000" dirty="0">
+                <a:solidFill>
+                  <a:srgbClr val="000000"/>
+                </a:solidFill>
+                <a:latin typeface="Courier New" panose="02070309020205020404" pitchFamily="49" charset="0"/>
+              </a:rPr>
+              <a:t>M_PI</a:t>
+            </a:r>
+            <a:r>
+              <a:rPr lang="en-US" sz="2000" b="1" dirty="0">
+                <a:solidFill>
+                  <a:srgbClr val="000080"/>
+                </a:solidFill>
+                <a:latin typeface="Courier New" panose="02070309020205020404" pitchFamily="49" charset="0"/>
+              </a:rPr>
+              <a:t>*</a:t>
+            </a:r>
+            <a:r>
+              <a:rPr lang="en-US" sz="2000" dirty="0">
+                <a:solidFill>
+                  <a:srgbClr val="000000"/>
+                </a:solidFill>
+                <a:latin typeface="Courier New" panose="02070309020205020404" pitchFamily="49" charset="0"/>
+              </a:rPr>
+              <a:t>pow</a:t>
+            </a:r>
+            <a:r>
+              <a:rPr lang="en-US" sz="2000" b="1" dirty="0">
+                <a:solidFill>
+                  <a:srgbClr val="000080"/>
+                </a:solidFill>
+                <a:latin typeface="Courier New" panose="02070309020205020404" pitchFamily="49" charset="0"/>
+              </a:rPr>
+              <a:t>(</a:t>
+            </a:r>
+            <a:r>
+              <a:rPr lang="en-US" sz="2000" dirty="0">
+                <a:solidFill>
+                  <a:srgbClr val="000000"/>
+                </a:solidFill>
+                <a:latin typeface="Courier New" panose="02070309020205020404" pitchFamily="49" charset="0"/>
+              </a:rPr>
+              <a:t>x,</a:t>
+            </a:r>
+            <a:r>
+              <a:rPr lang="en-US" sz="2000" dirty="0">
+                <a:solidFill>
+                  <a:srgbClr val="FF8000"/>
+                </a:solidFill>
+                <a:latin typeface="Courier New" panose="02070309020205020404" pitchFamily="49" charset="0"/>
+              </a:rPr>
+              <a:t>3</a:t>
+            </a:r>
+            <a:r>
+              <a:rPr lang="en-US" sz="2000" b="1" dirty="0">
+                <a:solidFill>
+                  <a:srgbClr val="000080"/>
+                </a:solidFill>
+                <a:latin typeface="Courier New" panose="02070309020205020404" pitchFamily="49" charset="0"/>
+              </a:rPr>
+              <a:t>))</a:t>
+            </a:r>
+            <a:r>
+              <a:rPr lang="en-US" sz="2000" dirty="0">
+                <a:solidFill>
+                  <a:srgbClr val="000000"/>
+                </a:solidFill>
+                <a:latin typeface="Courier New" panose="02070309020205020404" pitchFamily="49" charset="0"/>
+              </a:rPr>
+              <a:t> – </a:t>
+            </a:r>
+          </a:p>
+          <a:p>
+            <a:r>
+              <a:rPr lang="en-US" sz="2000" b="1" dirty="0">
+                <a:solidFill>
+                  <a:srgbClr val="000000"/>
+                </a:solidFill>
+                <a:latin typeface="Courier New" panose="02070309020205020404" pitchFamily="49" charset="0"/>
+              </a:rPr>
+              <a:t>   </a:t>
+            </a:r>
+            <a:r>
+              <a:rPr lang="en-US" sz="2000" b="1" dirty="0">
+                <a:solidFill>
+                  <a:srgbClr val="000080"/>
+                </a:solidFill>
+                <a:latin typeface="Courier New" panose="02070309020205020404" pitchFamily="49" charset="0"/>
+              </a:rPr>
+              <a:t>(</a:t>
+            </a:r>
+            <a:r>
+              <a:rPr lang="en-US" sz="2000" dirty="0">
+                <a:solidFill>
+                  <a:srgbClr val="000000"/>
+                </a:solidFill>
+                <a:latin typeface="Courier New" panose="02070309020205020404" pitchFamily="49" charset="0"/>
+              </a:rPr>
+              <a:t>shape </a:t>
+            </a:r>
+            <a:r>
+              <a:rPr lang="en-US" sz="2000" b="1" dirty="0">
+                <a:solidFill>
+                  <a:srgbClr val="000080"/>
+                </a:solidFill>
+                <a:latin typeface="Courier New" panose="02070309020205020404" pitchFamily="49" charset="0"/>
+              </a:rPr>
+              <a:t>*</a:t>
+            </a:r>
+            <a:r>
+              <a:rPr lang="en-US" sz="2000" dirty="0">
+                <a:solidFill>
+                  <a:srgbClr val="000000"/>
+                </a:solidFill>
+                <a:latin typeface="Courier New" panose="02070309020205020404" pitchFamily="49" charset="0"/>
+              </a:rPr>
+              <a:t> pow</a:t>
+            </a:r>
+            <a:r>
+              <a:rPr lang="en-US" sz="2000" b="1" dirty="0">
+                <a:solidFill>
+                  <a:srgbClr val="000080"/>
+                </a:solidFill>
+                <a:latin typeface="Courier New" panose="02070309020205020404" pitchFamily="49" charset="0"/>
+              </a:rPr>
+              <a:t>(</a:t>
+            </a:r>
+            <a:r>
+              <a:rPr lang="en-US" sz="2000" dirty="0">
+                <a:solidFill>
+                  <a:srgbClr val="000000"/>
+                </a:solidFill>
+                <a:latin typeface="Courier New" panose="02070309020205020404" pitchFamily="49" charset="0"/>
+              </a:rPr>
+              <a:t>x</a:t>
+            </a:r>
+            <a:r>
+              <a:rPr lang="en-US" sz="2000" b="1" dirty="0">
+                <a:solidFill>
+                  <a:srgbClr val="000080"/>
+                </a:solidFill>
+                <a:latin typeface="Courier New" panose="02070309020205020404" pitchFamily="49" charset="0"/>
+              </a:rPr>
+              <a:t>-</a:t>
+            </a:r>
+            <a:r>
+              <a:rPr lang="en-US" sz="2000" dirty="0">
+                <a:solidFill>
+                  <a:srgbClr val="8000FF"/>
+                </a:solidFill>
+                <a:latin typeface="Courier New" panose="02070309020205020404" pitchFamily="49" charset="0"/>
+              </a:rPr>
+              <a:t>mean</a:t>
+            </a:r>
+            <a:r>
+              <a:rPr lang="en-US" sz="2000" dirty="0">
+                <a:solidFill>
+                  <a:srgbClr val="000000"/>
+                </a:solidFill>
+                <a:latin typeface="Courier New" panose="02070309020205020404" pitchFamily="49" charset="0"/>
+              </a:rPr>
+              <a:t>,</a:t>
+            </a:r>
+            <a:r>
+              <a:rPr lang="en-US" sz="2000" dirty="0">
+                <a:solidFill>
+                  <a:srgbClr val="FF8000"/>
+                </a:solidFill>
+                <a:latin typeface="Courier New" panose="02070309020205020404" pitchFamily="49" charset="0"/>
+              </a:rPr>
+              <a:t>2</a:t>
+            </a:r>
+            <a:r>
+              <a:rPr lang="en-US" sz="2000" b="1" dirty="0">
+                <a:solidFill>
+                  <a:srgbClr val="000080"/>
+                </a:solidFill>
+                <a:latin typeface="Courier New" panose="02070309020205020404" pitchFamily="49" charset="0"/>
+              </a:rPr>
+              <a:t>)</a:t>
+            </a:r>
+            <a:r>
+              <a:rPr lang="en-US" sz="2000" dirty="0">
+                <a:solidFill>
+                  <a:srgbClr val="000000"/>
+                </a:solidFill>
+                <a:latin typeface="Courier New" panose="02070309020205020404" pitchFamily="49" charset="0"/>
+              </a:rPr>
+              <a:t> </a:t>
+            </a:r>
+            <a:r>
+              <a:rPr lang="en-US" sz="2000" b="1" dirty="0">
+                <a:solidFill>
+                  <a:srgbClr val="000080"/>
+                </a:solidFill>
+                <a:latin typeface="Courier New" panose="02070309020205020404" pitchFamily="49" charset="0"/>
+              </a:rPr>
+              <a:t>/</a:t>
+            </a:r>
+            <a:r>
+              <a:rPr lang="en-US" sz="2000" dirty="0">
+                <a:solidFill>
+                  <a:srgbClr val="000000"/>
+                </a:solidFill>
+                <a:latin typeface="Courier New" panose="02070309020205020404" pitchFamily="49" charset="0"/>
+              </a:rPr>
+              <a:t> </a:t>
+            </a:r>
+            <a:r>
+              <a:rPr lang="en-US" sz="2000" b="1" dirty="0">
+                <a:solidFill>
+                  <a:srgbClr val="000080"/>
+                </a:solidFill>
+                <a:latin typeface="Courier New" panose="02070309020205020404" pitchFamily="49" charset="0"/>
+              </a:rPr>
+              <a:t>(</a:t>
+            </a:r>
+            <a:r>
+              <a:rPr lang="en-US" sz="2000" dirty="0">
+                <a:solidFill>
+                  <a:srgbClr val="FF8000"/>
+                </a:solidFill>
+                <a:latin typeface="Courier New" panose="02070309020205020404" pitchFamily="49" charset="0"/>
+              </a:rPr>
+              <a:t>2</a:t>
+            </a:r>
+            <a:r>
+              <a:rPr lang="en-US" sz="2000" b="1" dirty="0">
+                <a:solidFill>
+                  <a:srgbClr val="000080"/>
+                </a:solidFill>
+                <a:latin typeface="Courier New" panose="02070309020205020404" pitchFamily="49" charset="0"/>
+              </a:rPr>
+              <a:t>*</a:t>
+            </a:r>
+            <a:r>
+              <a:rPr lang="en-US" sz="2000" dirty="0">
+                <a:solidFill>
+                  <a:srgbClr val="000000"/>
+                </a:solidFill>
+                <a:latin typeface="Courier New" panose="02070309020205020404" pitchFamily="49" charset="0"/>
+              </a:rPr>
+              <a:t>pow</a:t>
+            </a:r>
+            <a:r>
+              <a:rPr lang="en-US" sz="2000" b="1" dirty="0">
+                <a:solidFill>
+                  <a:srgbClr val="000080"/>
+                </a:solidFill>
+                <a:latin typeface="Courier New" panose="02070309020205020404" pitchFamily="49" charset="0"/>
+              </a:rPr>
+              <a:t>(</a:t>
+            </a:r>
+            <a:r>
+              <a:rPr lang="en-US" sz="2000" dirty="0">
+                <a:solidFill>
+                  <a:srgbClr val="8000FF"/>
+                </a:solidFill>
+                <a:latin typeface="Courier New" panose="02070309020205020404" pitchFamily="49" charset="0"/>
+              </a:rPr>
+              <a:t>mean</a:t>
+            </a:r>
+            <a:r>
+              <a:rPr lang="en-US" sz="2000" dirty="0">
+                <a:solidFill>
+                  <a:srgbClr val="000000"/>
+                </a:solidFill>
+                <a:latin typeface="Courier New" panose="02070309020205020404" pitchFamily="49" charset="0"/>
+              </a:rPr>
+              <a:t>,</a:t>
+            </a:r>
+            <a:r>
+              <a:rPr lang="en-US" sz="2000" dirty="0">
+                <a:solidFill>
+                  <a:srgbClr val="FF8000"/>
+                </a:solidFill>
+                <a:latin typeface="Courier New" panose="02070309020205020404" pitchFamily="49" charset="0"/>
+              </a:rPr>
+              <a:t>2</a:t>
+            </a:r>
+            <a:r>
+              <a:rPr lang="en-US" sz="2000" b="1" dirty="0">
+                <a:solidFill>
+                  <a:srgbClr val="000080"/>
+                </a:solidFill>
+                <a:latin typeface="Courier New" panose="02070309020205020404" pitchFamily="49" charset="0"/>
+              </a:rPr>
+              <a:t>)*</a:t>
+            </a:r>
+            <a:r>
+              <a:rPr lang="en-US" sz="2000" dirty="0">
+                <a:solidFill>
+                  <a:srgbClr val="000000"/>
+                </a:solidFill>
+                <a:latin typeface="Courier New" panose="02070309020205020404" pitchFamily="49" charset="0"/>
+              </a:rPr>
+              <a:t>x</a:t>
+            </a:r>
+            <a:r>
+              <a:rPr lang="en-US" sz="2000" b="1" dirty="0">
+                <a:solidFill>
+                  <a:srgbClr val="000080"/>
+                </a:solidFill>
+                <a:latin typeface="Courier New" panose="02070309020205020404" pitchFamily="49" charset="0"/>
+              </a:rPr>
+              <a:t>))</a:t>
+            </a:r>
+            <a:r>
+              <a:rPr lang="en-US" sz="2000" dirty="0">
+                <a:solidFill>
+                  <a:srgbClr val="000000"/>
+                </a:solidFill>
+                <a:latin typeface="Courier New" panose="02070309020205020404" pitchFamily="49" charset="0"/>
+              </a:rPr>
+              <a:t>; </a:t>
+            </a:r>
+            <a:r>
+              <a:rPr lang="en-US" sz="2000" b="1" dirty="0">
+                <a:solidFill>
+                  <a:srgbClr val="0000FF"/>
+                </a:solidFill>
+                <a:latin typeface="Courier New" panose="02070309020205020404" pitchFamily="49" charset="0"/>
+              </a:rPr>
+              <a:t>if</a:t>
+            </a:r>
+            <a:r>
+              <a:rPr lang="en-US" sz="2000" b="1" dirty="0">
+                <a:solidFill>
+                  <a:srgbClr val="000080"/>
+                </a:solidFill>
+                <a:latin typeface="Courier New" panose="02070309020205020404" pitchFamily="49" charset="0"/>
+              </a:rPr>
+              <a:t>(</a:t>
+            </a:r>
+            <a:r>
+              <a:rPr lang="en-US" sz="2000" dirty="0" err="1">
+                <a:solidFill>
+                  <a:srgbClr val="000000"/>
+                </a:solidFill>
+                <a:latin typeface="Courier New" panose="02070309020205020404" pitchFamily="49" charset="0"/>
+              </a:rPr>
+              <a:t>give_log</a:t>
+            </a:r>
+            <a:r>
+              <a:rPr lang="en-US" sz="2000" b="1" dirty="0">
+                <a:solidFill>
+                  <a:srgbClr val="000080"/>
+                </a:solidFill>
+                <a:latin typeface="Courier New" panose="02070309020205020404" pitchFamily="49" charset="0"/>
+              </a:rPr>
+              <a:t>)</a:t>
+            </a:r>
+            <a:r>
+              <a:rPr lang="en-US" sz="2000" dirty="0">
+                <a:solidFill>
+                  <a:srgbClr val="000000"/>
+                </a:solidFill>
+                <a:latin typeface="Courier New" panose="02070309020205020404" pitchFamily="49" charset="0"/>
+              </a:rPr>
+              <a:t> </a:t>
+            </a:r>
+            <a:r>
+              <a:rPr lang="en-US" sz="2000" dirty="0">
+                <a:solidFill>
+                  <a:srgbClr val="8000FF"/>
+                </a:solidFill>
+                <a:latin typeface="Courier New" panose="02070309020205020404" pitchFamily="49" charset="0"/>
+              </a:rPr>
+              <a:t>return</a:t>
+            </a:r>
+            <a:r>
+              <a:rPr lang="en-US" sz="2000" dirty="0">
+                <a:solidFill>
+                  <a:srgbClr val="000000"/>
+                </a:solidFill>
+                <a:latin typeface="Courier New" panose="02070309020205020404" pitchFamily="49" charset="0"/>
+              </a:rPr>
+              <a:t> </a:t>
+            </a:r>
+            <a:r>
+              <a:rPr lang="en-US" sz="2000" dirty="0" err="1">
+                <a:solidFill>
+                  <a:srgbClr val="000000"/>
+                </a:solidFill>
+                <a:latin typeface="Courier New" panose="02070309020205020404" pitchFamily="49" charset="0"/>
+              </a:rPr>
+              <a:t>logres</a:t>
+            </a:r>
+            <a:r>
+              <a:rPr lang="en-US" sz="2000" dirty="0">
+                <a:solidFill>
+                  <a:srgbClr val="000000"/>
+                </a:solidFill>
+                <a:latin typeface="Courier New" panose="02070309020205020404" pitchFamily="49" charset="0"/>
+              </a:rPr>
+              <a:t>; </a:t>
+            </a:r>
+            <a:r>
+              <a:rPr lang="en-US" sz="2000" b="1" dirty="0">
+                <a:solidFill>
+                  <a:srgbClr val="0000FF"/>
+                </a:solidFill>
+                <a:latin typeface="Courier New" panose="02070309020205020404" pitchFamily="49" charset="0"/>
+              </a:rPr>
+              <a:t>else</a:t>
+            </a:r>
+            <a:r>
+              <a:rPr lang="en-US" sz="2000" dirty="0">
+                <a:solidFill>
+                  <a:srgbClr val="000000"/>
+                </a:solidFill>
+                <a:latin typeface="Courier New" panose="02070309020205020404" pitchFamily="49" charset="0"/>
+              </a:rPr>
+              <a:t> </a:t>
+            </a:r>
+            <a:r>
+              <a:rPr lang="en-US" sz="2000" dirty="0">
+                <a:solidFill>
+                  <a:srgbClr val="8000FF"/>
+                </a:solidFill>
+                <a:latin typeface="Courier New" panose="02070309020205020404" pitchFamily="49" charset="0"/>
+              </a:rPr>
+              <a:t>return</a:t>
+            </a:r>
+            <a:r>
+              <a:rPr lang="en-US" sz="2000" dirty="0">
+                <a:solidFill>
+                  <a:srgbClr val="000000"/>
+                </a:solidFill>
+                <a:latin typeface="Courier New" panose="02070309020205020404" pitchFamily="49" charset="0"/>
+              </a:rPr>
+              <a:t> </a:t>
+            </a:r>
+            <a:r>
+              <a:rPr lang="en-US" sz="2000" dirty="0" err="1">
+                <a:solidFill>
+                  <a:srgbClr val="8000FF"/>
+                </a:solidFill>
+                <a:latin typeface="Courier New" panose="02070309020205020404" pitchFamily="49" charset="0"/>
+              </a:rPr>
+              <a:t>exp</a:t>
+            </a:r>
+            <a:r>
+              <a:rPr lang="en-US" sz="2000" b="1" dirty="0">
+                <a:solidFill>
+                  <a:srgbClr val="000080"/>
+                </a:solidFill>
+                <a:latin typeface="Courier New" panose="02070309020205020404" pitchFamily="49" charset="0"/>
+              </a:rPr>
+              <a:t>(</a:t>
+            </a:r>
+            <a:r>
+              <a:rPr lang="en-US" sz="2000" dirty="0" err="1">
+                <a:solidFill>
+                  <a:srgbClr val="000000"/>
+                </a:solidFill>
+                <a:latin typeface="Courier New" panose="02070309020205020404" pitchFamily="49" charset="0"/>
+              </a:rPr>
+              <a:t>logres</a:t>
+            </a:r>
+            <a:r>
+              <a:rPr lang="en-US" sz="2000" b="1" dirty="0">
+                <a:solidFill>
+                  <a:srgbClr val="000080"/>
+                </a:solidFill>
+                <a:latin typeface="Courier New" panose="02070309020205020404" pitchFamily="49" charset="0"/>
+              </a:rPr>
+              <a:t>)</a:t>
+            </a:r>
+            <a:r>
+              <a:rPr lang="en-US" sz="2000" dirty="0">
+                <a:solidFill>
+                  <a:srgbClr val="000000"/>
+                </a:solidFill>
+                <a:latin typeface="Courier New" panose="02070309020205020404" pitchFamily="49" charset="0"/>
+              </a:rPr>
+              <a:t>; </a:t>
+            </a:r>
+            <a:r>
+              <a:rPr lang="en-US" sz="2000" b="1" dirty="0">
+                <a:solidFill>
+                  <a:srgbClr val="000080"/>
+                </a:solidFill>
+                <a:latin typeface="Courier New" panose="02070309020205020404" pitchFamily="49" charset="0"/>
+              </a:rPr>
+              <a:t>}</a:t>
+            </a:r>
+            <a:endParaRPr lang="en-US" sz="2000" dirty="0"/>
+          </a:p>
+          <a:p>
+            <a:endParaRPr lang="en-US" dirty="0">
+              <a:latin typeface="Courier New" panose="02070309020205020404" pitchFamily="49" charset="0"/>
+              <a:cs typeface="Courier New" panose="02070309020205020404" pitchFamily="49" charset="0"/>
+            </a:endParaRPr>
+          </a:p>
+        </p:txBody>
+      </p:sp>
     </p:spTree>
     <p:extLst>
       <p:ext uri="{BB962C8B-B14F-4D97-AF65-F5344CB8AC3E}">
-        <p14:creationId xmlns:p14="http://schemas.microsoft.com/office/powerpoint/2010/main" val="3466936916"/>
+        <p14:creationId xmlns:p14="http://schemas.microsoft.com/office/powerpoint/2010/main" val="2046246629"/>
       </p:ext>
     </p:extLst>
   </p:cSld>
@@ -12824,6 +13757,133 @@
           <p:cNvPr id="2" name="Title 1">
             <a:extLst>
               <a:ext uri="{FF2B5EF4-FFF2-40B4-BE49-F238E27FC236}">
+                <a16:creationId xmlns:a16="http://schemas.microsoft.com/office/drawing/2014/main" id="{159784FA-3D00-4D6B-B4DF-95D2F9370B8E}"/>
+              </a:ext>
+            </a:extLst>
+          </p:cNvPr>
+          <p:cNvSpPr>
+            <a:spLocks noGrp="1"/>
+          </p:cNvSpPr>
+          <p:nvPr>
+            <p:ph type="title"/>
+          </p:nvPr>
+        </p:nvSpPr>
+        <p:spPr/>
+        <p:txBody>
+          <a:bodyPr/>
+          <a:lstStyle/>
+          <a:p>
+            <a:r>
+              <a:rPr lang="en-US" dirty="0"/>
+              <a:t>Bayesian additions</a:t>
+            </a:r>
+          </a:p>
+        </p:txBody>
+      </p:sp>
+      <p:sp>
+        <p:nvSpPr>
+          <p:cNvPr id="3" name="Content Placeholder 2">
+            <a:extLst>
+              <a:ext uri="{FF2B5EF4-FFF2-40B4-BE49-F238E27FC236}">
+                <a16:creationId xmlns:a16="http://schemas.microsoft.com/office/drawing/2014/main" id="{5CD64A8C-0FEA-42B0-B05D-3AE8B9062C05}"/>
+              </a:ext>
+            </a:extLst>
+          </p:cNvPr>
+          <p:cNvSpPr>
+            <a:spLocks noGrp="1"/>
+          </p:cNvSpPr>
+          <p:nvPr>
+            <p:ph idx="1"/>
+          </p:nvPr>
+        </p:nvSpPr>
+        <p:spPr/>
+        <p:txBody>
+          <a:bodyPr/>
+          <a:lstStyle/>
+          <a:p>
+            <a:r>
+              <a:rPr lang="en-US" dirty="0"/>
+              <a:t>This model is setup to do a Bayesian analysis</a:t>
+            </a:r>
+          </a:p>
+          <a:p>
+            <a:r>
+              <a:rPr lang="en-US" dirty="0"/>
+              <a:t>Tomorrow we will return and look at this more closely and run it</a:t>
+            </a:r>
+          </a:p>
+          <a:p>
+            <a:r>
+              <a:rPr lang="en-US" dirty="0"/>
+              <a:t>We ignore them for now</a:t>
+            </a:r>
+          </a:p>
+        </p:txBody>
+      </p:sp>
+      <p:sp>
+        <p:nvSpPr>
+          <p:cNvPr id="4" name="Slide Number Placeholder 3">
+            <a:extLst>
+              <a:ext uri="{FF2B5EF4-FFF2-40B4-BE49-F238E27FC236}">
+                <a16:creationId xmlns:a16="http://schemas.microsoft.com/office/drawing/2014/main" id="{ECA783B1-D58E-4038-BFFC-739F09B404D6}"/>
+              </a:ext>
+            </a:extLst>
+          </p:cNvPr>
+          <p:cNvSpPr>
+            <a:spLocks noGrp="1"/>
+          </p:cNvSpPr>
+          <p:nvPr>
+            <p:ph type="sldNum" sz="quarter" idx="12"/>
+          </p:nvPr>
+        </p:nvSpPr>
+        <p:spPr/>
+        <p:txBody>
+          <a:bodyPr/>
+          <a:lstStyle/>
+          <a:p>
+            <a:fld id="{2F5854F6-968A-43DD-98AD-2128488B7BB7}" type="slidenum">
+              <a:rPr lang="en-US" smtClean="0"/>
+              <a:t>26</a:t>
+            </a:fld>
+            <a:endParaRPr lang="en-US"/>
+          </a:p>
+        </p:txBody>
+      </p:sp>
+    </p:spTree>
+    <p:extLst>
+      <p:ext uri="{BB962C8B-B14F-4D97-AF65-F5344CB8AC3E}">
+        <p14:creationId xmlns:p14="http://schemas.microsoft.com/office/powerpoint/2010/main" val="3466936916"/>
+      </p:ext>
+    </p:extLst>
+  </p:cSld>
+  <p:clrMapOvr>
+    <a:masterClrMapping/>
+  </p:clrMapOvr>
+</p:sld>
+</file>
+
+<file path=ppt/slides/slide27.xml><?xml version="1.0" encoding="utf-8"?>
+<p:sld xmlns:a="http://schemas.openxmlformats.org/drawingml/2006/main" xmlns:r="http://schemas.openxmlformats.org/officeDocument/2006/relationships" xmlns:p="http://schemas.openxmlformats.org/presentationml/2006/main">
+  <p:cSld>
+    <p:spTree>
+      <p:nvGrpSpPr>
+        <p:cNvPr id="1" name=""/>
+        <p:cNvGrpSpPr/>
+        <p:nvPr/>
+      </p:nvGrpSpPr>
+      <p:grpSpPr>
+        <a:xfrm>
+          <a:off x="0" y="0"/>
+          <a:ext cx="0" cy="0"/>
+          <a:chOff x="0" y="0"/>
+          <a:chExt cx="0" cy="0"/>
+        </a:xfrm>
+      </p:grpSpPr>
+      <p:sp>
+        <p:nvSpPr>
+          <p:cNvPr id="2" name="Title 1">
+            <a:extLst>
+              <a:ext uri="{FF2B5EF4-FFF2-40B4-BE49-F238E27FC236}">
                 <a16:creationId xmlns:a16="http://schemas.microsoft.com/office/drawing/2014/main" id="{5305BC89-1142-4F47-94F0-AE84AFE957CA}"/>
               </a:ext>
             </a:extLst>
@@ -12976,7 +14036,7 @@
           <a:p>
             <a:fld id="{2F5854F6-968A-43DD-98AD-2128488B7BB7}" type="slidenum">
               <a:rPr lang="en-US" smtClean="0"/>
-              <a:t>26</a:t>
+              <a:t>27</a:t>
             </a:fld>
             <a:endParaRPr lang="en-US"/>
           </a:p>

</xml_diff>